<commit_message>
chapter 3 with the corresponding py code
</commit_message>
<xml_diff>
--- a/lectures3/gr/Pythonlearn-03-Conditional.pptx
+++ b/lectures3/gr/Pythonlearn-03-Conditional.pptx
@@ -5809,7 +5809,7 @@
                 <a:cs typeface="Arial" charset="0"/>
                 <a:sym typeface="Cabin"/>
               </a:rPr>
-              <a:t>Υπό όρους Εκτέλεση</a:t>
+              <a:t>Δομή Επιλογής</a:t>
             </a:r>
             <a:endParaRPr lang="en-US" sz="7600" u="none" strike="noStrike" cap="none" dirty="0">
               <a:solidFill>
@@ -21998,7 +21998,7 @@
               <a:buNone/>
             </a:pPr>
             <a:r>
-              <a:rPr lang="el-GR" sz="7600" u="none" strike="noStrike" cap="none" dirty="0" err="1">
+              <a:rPr lang="el-GR" sz="7600" u="none" strike="noStrike" cap="none" dirty="0">
                 <a:solidFill>
                   <a:srgbClr val="FFD966"/>
                 </a:solidFill>
@@ -22007,19 +22007,7 @@
                 <a:cs typeface="Arial" charset="0"/>
                 <a:sym typeface="Cabin"/>
               </a:rPr>
-              <a:t>Γρύφος</a:t>
-            </a:r>
-            <a:r>
-              <a:rPr lang="el-GR" sz="7600" u="none" strike="noStrike" cap="none" dirty="0">
-                <a:solidFill>
-                  <a:srgbClr val="FFD966"/>
-                </a:solidFill>
-                <a:latin typeface="Arial" charset="0"/>
-                <a:ea typeface="Arial" charset="0"/>
-                <a:cs typeface="Arial" charset="0"/>
-                <a:sym typeface="Cabin"/>
-              </a:rPr>
-              <a:t> Πολλαπλών Επιλογών</a:t>
+              <a:t>Γρίφος Πολλαπλών Επιλογών</a:t>
             </a:r>
             <a:endParaRPr lang="en-US" sz="7600" u="none" strike="noStrike" cap="none" dirty="0">
               <a:solidFill>
@@ -33497,7 +33485,7 @@
                 <a:cs typeface="Arial" charset="0"/>
                 <a:sym typeface="Cabin"/>
               </a:rPr>
-              <a:t>Ξαναγράψτε το πρόγραμμά σας για τον υπολογισμό της αμοιβής, ώστε να δώσετε στον υπάλληλο 1,5 φορές την ωριαία χρέωση για τις ώρες εργασίας πέραν των 40 ωρών</a:t>
+              <a:t>Ξαναγράψτε το πρόγραμμά σας για τον υπολογισμό της αμοιβής, ώστε να δώσετε στον υπάλληλο 1,5 φορές το ωρομίσθιο για τις ώρες εργασίας πέραν των 40 ωρών</a:t>
             </a:r>
             <a:r>
               <a:rPr lang="en-US" sz="3800" u="none" strike="noStrike" cap="none" dirty="0">
@@ -33824,7 +33812,7 @@
         </p:nvSpPr>
         <p:spPr>
           <a:xfrm>
-            <a:off x="509457" y="837575"/>
+            <a:off x="509457" y="840806"/>
             <a:ext cx="2503566" cy="660400"/>
           </a:xfrm>
           <a:prstGeom prst="rect">
@@ -33890,8 +33878,8 @@
         </p:nvSpPr>
         <p:spPr>
           <a:xfrm>
-            <a:off x="3136900" y="1916225"/>
-            <a:ext cx="10706100" cy="5689499"/>
+            <a:off x="1031461" y="2035495"/>
+            <a:ext cx="14193078" cy="5689499"/>
           </a:xfrm>
           <a:prstGeom prst="rect">
             <a:avLst/>
@@ -34006,7 +33994,7 @@
                 <a:cs typeface="Arial" charset="0"/>
                 <a:sym typeface="Cabin"/>
               </a:rPr>
-              <a:t>το πρόγραμμά σας να χειρίζεται μη-αριθμητικά δεδομένα εισόδου χαριτωμένα</a:t>
+              <a:t>το πρόγραμμά σας να χειρίζεται μη αριθμητικές τιμές εισόδου σωστά, εκτυπώνοντας ένα μήνυμα και τερματίζοντας την εκτέλεση</a:t>
             </a:r>
             <a:r>
               <a:rPr lang="en-US" sz="3800" u="none" strike="noStrike" cap="none" dirty="0">
@@ -34158,7 +34146,7 @@
               <a:t>: </a:t>
             </a:r>
             <a:r>
-              <a:rPr lang="en-US" sz="3800" u="none" strike="noStrike" cap="none" dirty="0">
+              <a:rPr lang="el-GR" sz="3800" u="none" strike="noStrike" cap="none" dirty="0">
                 <a:solidFill>
                   <a:srgbClr val="FFFF00"/>
                 </a:solidFill>
@@ -34167,7 +34155,7 @@
                 <a:cs typeface="Courier" charset="0"/>
                 <a:sym typeface="Cabin"/>
               </a:rPr>
-              <a:t>nine</a:t>
+              <a:t>εννιά</a:t>
             </a:r>
             <a:r>
               <a:rPr lang="en-US" sz="3800" u="none" strike="noStrike" cap="none" dirty="0">
@@ -34210,31 +34198,7 @@
                 <a:cs typeface="Courier" charset="0"/>
                 <a:sym typeface="Cabin"/>
               </a:rPr>
-              <a:t>Λάθος</a:t>
-            </a:r>
-            <a:r>
-              <a:rPr lang="en-US" sz="3800" u="none" strike="noStrike" cap="none" dirty="0">
-                <a:solidFill>
-                  <a:srgbClr val="E06666"/>
-                </a:solidFill>
-                <a:latin typeface="Courier" charset="0"/>
-                <a:ea typeface="Courier" charset="0"/>
-                <a:cs typeface="Courier" charset="0"/>
-                <a:sym typeface="Cabin"/>
-              </a:rPr>
-              <a:t>, </a:t>
-            </a:r>
-            <a:r>
-              <a:rPr lang="el-GR" sz="3800" u="none" strike="noStrike" cap="none" dirty="0">
-                <a:solidFill>
-                  <a:srgbClr val="E06666"/>
-                </a:solidFill>
-                <a:latin typeface="Courier" charset="0"/>
-                <a:ea typeface="Courier" charset="0"/>
-                <a:cs typeface="Courier" charset="0"/>
-                <a:sym typeface="Cabin"/>
-              </a:rPr>
-              <a:t>παρακαλώ εισάγεται αριθμό</a:t>
+              <a:t>Σφάλμα, παρακαλώ δώστε αριθμητική είσοδο</a:t>
             </a:r>
             <a:endParaRPr lang="en-US" sz="3800" u="none" strike="noStrike" cap="none" dirty="0">
               <a:solidFill>
@@ -34312,7 +34276,7 @@
               <a:t>: </a:t>
             </a:r>
             <a:r>
-              <a:rPr lang="en-US" sz="3800" u="none" strike="noStrike" cap="none" dirty="0">
+              <a:rPr lang="el-GR" sz="3800" u="none" strike="noStrike" cap="none" dirty="0">
                 <a:solidFill>
                   <a:srgbClr val="FFFF00"/>
                 </a:solidFill>
@@ -34321,7 +34285,7 @@
                 <a:cs typeface="Courier" charset="0"/>
                 <a:sym typeface="Cabin"/>
               </a:rPr>
-              <a:t>forty</a:t>
+              <a:t>σαράντα</a:t>
             </a:r>
             <a:r>
               <a:rPr lang="en-US" sz="3800" u="none" strike="noStrike" cap="none" dirty="0">
@@ -34353,31 +34317,7 @@
                 <a:cs typeface="Courier" charset="0"/>
                 <a:sym typeface="Cabin"/>
               </a:rPr>
-              <a:t>Λάθος</a:t>
-            </a:r>
-            <a:r>
-              <a:rPr lang="en-US" sz="3800" u="none" strike="noStrike" cap="none" dirty="0">
-                <a:solidFill>
-                  <a:srgbClr val="E06666"/>
-                </a:solidFill>
-                <a:latin typeface="Courier" charset="0"/>
-                <a:ea typeface="Courier" charset="0"/>
-                <a:cs typeface="Courier" charset="0"/>
-                <a:sym typeface="Cabin"/>
-              </a:rPr>
-              <a:t>, </a:t>
-            </a:r>
-            <a:r>
-              <a:rPr lang="el-GR" sz="3800" u="none" strike="noStrike" cap="none" dirty="0">
-                <a:solidFill>
-                  <a:srgbClr val="E06666"/>
-                </a:solidFill>
-                <a:latin typeface="Courier" charset="0"/>
-                <a:ea typeface="Courier" charset="0"/>
-                <a:cs typeface="Courier" charset="0"/>
-                <a:sym typeface="Cabin"/>
-              </a:rPr>
-              <a:t>παρακαλώ εισάγεται αριθμό</a:t>
+              <a:t>Σφάλμα, παρακαλώ δώστε αριθμητική είσοδο</a:t>
             </a:r>
             <a:endParaRPr lang="en-US" sz="3800" u="none" strike="noStrike" cap="none" dirty="0">
               <a:solidFill>

</xml_diff>